<commit_message>
Update ConvertRecurringSequenceDiagram in DG.
</commit_message>
<xml_diff>
--- a/docs/diagrams/ConvertRecurringSequenceDiagram.pptx
+++ b/docs/diagrams/ConvertRecurringSequenceDiagram.pptx
@@ -6128,41 +6128,6 @@
           </a:fontRef>
         </p:style>
       </p:cxnSp>
-      <p:sp>
-        <p:nvSpPr>
-          <p:cNvPr id="155" name="TextBox 154">
-            <a:extLst>
-              <a:ext uri="{FF2B5EF4-FFF2-40B4-BE49-F238E27FC236}">
-                <a16:creationId xmlns:a16="http://schemas.microsoft.com/office/drawing/2014/main" id="{A51A617B-AAE5-4443-AE57-C4498530A8DD}"/>
-              </a:ext>
-            </a:extLst>
-          </p:cNvPr>
-          <p:cNvSpPr txBox="1"/>
-          <p:nvPr/>
-        </p:nvSpPr>
-        <p:spPr>
-          <a:xfrm>
-            <a:off x="9278611" y="6474312"/>
-            <a:ext cx="381039" cy="323165"/>
-          </a:xfrm>
-          <a:prstGeom prst="rect">
-            <a:avLst/>
-          </a:prstGeom>
-          <a:noFill/>
-        </p:spPr>
-        <p:txBody>
-          <a:bodyPr wrap="square" rtlCol="0">
-            <a:spAutoFit/>
-          </a:bodyPr>
-          <a:lstStyle/>
-          <a:p>
-            <a:r>
-              <a:rPr lang="en-SG" sz="1500" b="1" dirty="0"/>
-              <a:t>X</a:t>
-            </a:r>
-          </a:p>
-        </p:txBody>
-      </p:sp>
       <p:sp>
         <p:nvSpPr>
           <p:cNvPr id="42" name="Rectangle 41">

</xml_diff>